<commit_message>
add slide to argmax
</commit_message>
<xml_diff>
--- a/Presentations/Stats - ArgMax.pptx
+++ b/Presentations/Stats - ArgMax.pptx
@@ -5,13 +5,14 @@
     <p:sldMasterId id="2147483648" r:id="rId1"/>
   </p:sldMasterIdLst>
   <p:notesMasterIdLst>
-    <p:notesMasterId r:id="rId6"/>
+    <p:notesMasterId r:id="rId7"/>
   </p:notesMasterIdLst>
   <p:sldIdLst>
     <p:sldId id="256" r:id="rId2"/>
     <p:sldId id="281" r:id="rId3"/>
     <p:sldId id="282" r:id="rId4"/>
     <p:sldId id="283" r:id="rId5"/>
+    <p:sldId id="284" r:id="rId6"/>
   </p:sldIdLst>
   <p:sldSz cx="9144000" cy="6858000" type="screen4x3"/>
   <p:notesSz cx="6858000" cy="9144000"/>
@@ -3440,10 +3441,6 @@
               <a:rPr lang="en-US" dirty="0" smtClean="0"/>
               <a:t> Equation</a:t>
             </a:r>
-            <a:r>
-              <a:rPr lang="en-US" dirty="0" smtClean="0"/>
-              <a:t/>
-            </a:r>
             <a:br>
               <a:rPr lang="en-US" dirty="0" smtClean="0"/>
             </a:br>
@@ -3984,7 +3981,6 @@
               <a:rPr lang="en-US" dirty="0" smtClean="0"/>
               <a:t>R:  Set of Continuous Real Values</a:t>
             </a:r>
-            <a:endParaRPr lang="en-US" dirty="0" smtClean="0"/>
           </a:p>
           <a:p>
             <a:r>
@@ -4468,17 +4464,7 @@
                   </a:schemeClr>
                 </a:solidFill>
               </a:rPr>
-              <a:t>ArgM</a:t>
-            </a:r>
-            <a:r>
-              <a:rPr lang="en-US" dirty="0" err="1" smtClean="0">
-                <a:solidFill>
-                  <a:schemeClr val="accent1">
-                    <a:lumMod val="75000"/>
-                  </a:schemeClr>
-                </a:solidFill>
-              </a:rPr>
-              <a:t>ax</a:t>
+              <a:t>ArgMax</a:t>
             </a:r>
             <a:r>
               <a:rPr lang="en-US" dirty="0" smtClean="0">
@@ -4675,11 +4661,7 @@
             </a:r>
             <a:r>
               <a:rPr lang="en-US" dirty="0" smtClean="0"/>
-              <a:t>f(x)</a:t>
-            </a:r>
-            <a:r>
-              <a:rPr lang="en-US" dirty="0" smtClean="0"/>
-              <a:t> : function that takes x as an input</a:t>
+              <a:t>f(x) : function that takes x as an input</a:t>
             </a:r>
             <a:endParaRPr lang="en-US" sz="2400" b="1" dirty="0">
               <a:solidFill>
@@ -5786,6 +5768,1025 @@
     <p:extLst>
       <p:ext uri="{BB962C8B-B14F-4D97-AF65-F5344CB8AC3E}">
         <p14:creationId xmlns:p14="http://schemas.microsoft.com/office/powerpoint/2010/main" val="3715285741"/>
+      </p:ext>
+    </p:extLst>
+  </p:cSld>
+  <p:clrMapOvr>
+    <a:masterClrMapping/>
+  </p:clrMapOvr>
+  <p:timing>
+    <p:tnLst>
+      <p:par>
+        <p:cTn id="1" dur="indefinite" restart="never" nodeType="tmRoot"/>
+      </p:par>
+    </p:tnLst>
+  </p:timing>
+</p:sld>
+</file>
+
+<file path=ppt/slides/slide5.xml><?xml version="1.0" encoding="utf-8"?>
+<p:sld xmlns:a="http://schemas.openxmlformats.org/drawingml/2006/main" xmlns:r="http://schemas.openxmlformats.org/officeDocument/2006/relationships" xmlns:p="http://schemas.openxmlformats.org/presentationml/2006/main">
+  <p:cSld>
+    <p:spTree>
+      <p:nvGrpSpPr>
+        <p:cNvPr id="1" name=""/>
+        <p:cNvGrpSpPr/>
+        <p:nvPr/>
+      </p:nvGrpSpPr>
+      <p:grpSpPr>
+        <a:xfrm>
+          <a:off x="0" y="0"/>
+          <a:ext cx="0" cy="0"/>
+          <a:chOff x="0" y="0"/>
+          <a:chExt cx="0" cy="0"/>
+        </a:xfrm>
+      </p:grpSpPr>
+      <p:sp>
+        <p:nvSpPr>
+          <p:cNvPr id="2" name="Title 1"/>
+          <p:cNvSpPr>
+            <a:spLocks noGrp="1"/>
+          </p:cNvSpPr>
+          <p:nvPr>
+            <p:ph type="title"/>
+          </p:nvPr>
+        </p:nvSpPr>
+        <p:spPr>
+          <a:xfrm>
+            <a:off x="457200" y="274638"/>
+            <a:ext cx="8305800" cy="792162"/>
+          </a:xfrm>
+        </p:spPr>
+        <p:txBody>
+          <a:bodyPr>
+            <a:normAutofit/>
+          </a:bodyPr>
+          <a:lstStyle/>
+          <a:p>
+            <a:pPr algn="l"/>
+            <a:r>
+              <a:rPr lang="en-US" dirty="0" smtClean="0">
+                <a:solidFill>
+                  <a:schemeClr val="accent1">
+                    <a:lumMod val="75000"/>
+                  </a:schemeClr>
+                </a:solidFill>
+              </a:rPr>
+              <a:t>Python – </a:t>
+            </a:r>
+            <a:r>
+              <a:rPr lang="en-US" dirty="0" err="1" smtClean="0">
+                <a:solidFill>
+                  <a:schemeClr val="accent1">
+                    <a:lumMod val="75000"/>
+                  </a:schemeClr>
+                </a:solidFill>
+              </a:rPr>
+              <a:t>Numpy.Argmax</a:t>
+            </a:r>
+            <a:endParaRPr lang="en-US" dirty="0">
+              <a:solidFill>
+                <a:schemeClr val="accent1">
+                  <a:lumMod val="75000"/>
+                </a:schemeClr>
+              </a:solidFill>
+            </a:endParaRPr>
+          </a:p>
+        </p:txBody>
+      </p:sp>
+      <p:cxnSp>
+        <p:nvCxnSpPr>
+          <p:cNvPr id="5" name="Straight Connector 4"/>
+          <p:cNvCxnSpPr/>
+          <p:nvPr/>
+        </p:nvCxnSpPr>
+        <p:spPr>
+          <a:xfrm>
+            <a:off x="0" y="990600"/>
+            <a:ext cx="9144000" cy="0"/>
+          </a:xfrm>
+          <a:prstGeom prst="line">
+            <a:avLst/>
+          </a:prstGeom>
+          <a:ln w="19050"/>
+        </p:spPr>
+        <p:style>
+          <a:lnRef idx="1">
+            <a:schemeClr val="accent1"/>
+          </a:lnRef>
+          <a:fillRef idx="0">
+            <a:schemeClr val="accent1"/>
+          </a:fillRef>
+          <a:effectRef idx="0">
+            <a:schemeClr val="accent1"/>
+          </a:effectRef>
+          <a:fontRef idx="minor">
+            <a:schemeClr val="tx1"/>
+          </a:fontRef>
+        </p:style>
+      </p:cxnSp>
+      <p:sp>
+        <p:nvSpPr>
+          <p:cNvPr id="15" name="TextBox 14"/>
+          <p:cNvSpPr txBox="1"/>
+          <p:nvPr/>
+        </p:nvSpPr>
+        <p:spPr>
+          <a:xfrm>
+            <a:off x="2649479" y="2665576"/>
+            <a:ext cx="2664960" cy="1200329"/>
+          </a:xfrm>
+          <a:prstGeom prst="rect">
+            <a:avLst/>
+          </a:prstGeom>
+          <a:noFill/>
+        </p:spPr>
+        <p:txBody>
+          <a:bodyPr wrap="none" rtlCol="0">
+            <a:spAutoFit/>
+          </a:bodyPr>
+          <a:lstStyle/>
+          <a:p>
+            <a:r>
+              <a:rPr lang="en-US" dirty="0" smtClean="0"/>
+              <a:t>data = </a:t>
+            </a:r>
+            <a:r>
+              <a:rPr lang="en-US" dirty="0" err="1" smtClean="0"/>
+              <a:t>np.array</a:t>
+            </a:r>
+            <a:r>
+              <a:rPr lang="en-US" dirty="0" smtClean="0"/>
+              <a:t>( [ 1, 2, 3 ] </a:t>
+            </a:r>
+            <a:r>
+              <a:rPr lang="en-US" dirty="0" smtClean="0"/>
+              <a:t>)</a:t>
+            </a:r>
+          </a:p>
+          <a:p>
+            <a:endParaRPr lang="en-US" dirty="0" smtClean="0"/>
+          </a:p>
+          <a:p>
+            <a:endParaRPr lang="en-US" dirty="0"/>
+          </a:p>
+          <a:p>
+            <a:r>
+              <a:rPr lang="en-US" dirty="0" smtClean="0"/>
+              <a:t>x = </a:t>
+            </a:r>
+            <a:r>
+              <a:rPr lang="en-US" dirty="0" err="1" smtClean="0"/>
+              <a:t>np.argmax</a:t>
+            </a:r>
+            <a:r>
+              <a:rPr lang="en-US" dirty="0" smtClean="0"/>
+              <a:t>( data )</a:t>
+            </a:r>
+            <a:endParaRPr lang="en-US" dirty="0" smtClean="0"/>
+          </a:p>
+        </p:txBody>
+      </p:sp>
+      <p:sp>
+        <p:nvSpPr>
+          <p:cNvPr id="16" name="TextBox 15"/>
+          <p:cNvSpPr txBox="1"/>
+          <p:nvPr/>
+        </p:nvSpPr>
+        <p:spPr>
+          <a:xfrm>
+            <a:off x="4876800" y="2040775"/>
+            <a:ext cx="2749727" cy="276999"/>
+          </a:xfrm>
+          <a:prstGeom prst="rect">
+            <a:avLst/>
+          </a:prstGeom>
+          <a:noFill/>
+        </p:spPr>
+        <p:txBody>
+          <a:bodyPr wrap="none" rtlCol="0">
+            <a:spAutoFit/>
+          </a:bodyPr>
+          <a:lstStyle/>
+          <a:p>
+            <a:r>
+              <a:rPr lang="en-US" sz="1200" dirty="0" err="1" smtClean="0">
+                <a:solidFill>
+                  <a:srgbClr val="00B050"/>
+                </a:solidFill>
+              </a:rPr>
+              <a:t>Numpy</a:t>
+            </a:r>
+            <a:r>
+              <a:rPr lang="en-US" sz="1200" dirty="0" smtClean="0">
+                <a:solidFill>
+                  <a:srgbClr val="00B050"/>
+                </a:solidFill>
+              </a:rPr>
+              <a:t> function to create a </a:t>
+            </a:r>
+            <a:r>
+              <a:rPr lang="en-US" sz="1200" dirty="0" err="1" smtClean="0">
+                <a:solidFill>
+                  <a:srgbClr val="00B050"/>
+                </a:solidFill>
+              </a:rPr>
+              <a:t>numpy</a:t>
+            </a:r>
+            <a:r>
+              <a:rPr lang="en-US" sz="1200" dirty="0" smtClean="0">
+                <a:solidFill>
+                  <a:srgbClr val="00B050"/>
+                </a:solidFill>
+              </a:rPr>
+              <a:t> array </a:t>
+            </a:r>
+            <a:endParaRPr lang="en-US" sz="1200" dirty="0">
+              <a:solidFill>
+                <a:srgbClr val="00B050"/>
+              </a:solidFill>
+            </a:endParaRPr>
+          </a:p>
+        </p:txBody>
+      </p:sp>
+      <p:cxnSp>
+        <p:nvCxnSpPr>
+          <p:cNvPr id="20" name="Curved Connector 19"/>
+          <p:cNvCxnSpPr/>
+          <p:nvPr/>
+        </p:nvCxnSpPr>
+        <p:spPr>
+          <a:xfrm rot="10800000" flipV="1">
+            <a:off x="3868680" y="2179274"/>
+            <a:ext cx="1008120" cy="533278"/>
+          </a:xfrm>
+          <a:prstGeom prst="curvedConnector3">
+            <a:avLst>
+              <a:gd name="adj1" fmla="val 100076"/>
+            </a:avLst>
+          </a:prstGeom>
+          <a:ln>
+            <a:solidFill>
+              <a:srgbClr val="00B050"/>
+            </a:solidFill>
+            <a:tailEnd type="arrow"/>
+          </a:ln>
+        </p:spPr>
+        <p:style>
+          <a:lnRef idx="1">
+            <a:schemeClr val="accent1"/>
+          </a:lnRef>
+          <a:fillRef idx="0">
+            <a:schemeClr val="accent1"/>
+          </a:fillRef>
+          <a:effectRef idx="0">
+            <a:schemeClr val="accent1"/>
+          </a:effectRef>
+          <a:fontRef idx="minor">
+            <a:schemeClr val="tx1"/>
+          </a:fontRef>
+        </p:style>
+      </p:cxnSp>
+      <p:sp>
+        <p:nvSpPr>
+          <p:cNvPr id="22" name="TextBox 21"/>
+          <p:cNvSpPr txBox="1"/>
+          <p:nvPr/>
+        </p:nvSpPr>
+        <p:spPr>
+          <a:xfrm>
+            <a:off x="676499" y="2033390"/>
+            <a:ext cx="1763431" cy="276999"/>
+          </a:xfrm>
+          <a:prstGeom prst="rect">
+            <a:avLst/>
+          </a:prstGeom>
+          <a:noFill/>
+        </p:spPr>
+        <p:txBody>
+          <a:bodyPr wrap="none" rtlCol="0">
+            <a:spAutoFit/>
+          </a:bodyPr>
+          <a:lstStyle/>
+          <a:p>
+            <a:r>
+              <a:rPr lang="en-US" sz="1200" dirty="0" smtClean="0">
+                <a:solidFill>
+                  <a:srgbClr val="00B050"/>
+                </a:solidFill>
+              </a:rPr>
+              <a:t>Value is: array( [ 1, 2, 3 ] )</a:t>
+            </a:r>
+            <a:endParaRPr lang="en-US" sz="1200" dirty="0">
+              <a:solidFill>
+                <a:srgbClr val="00B050"/>
+              </a:solidFill>
+            </a:endParaRPr>
+          </a:p>
+        </p:txBody>
+      </p:sp>
+      <p:cxnSp>
+        <p:nvCxnSpPr>
+          <p:cNvPr id="23" name="Curved Connector 22"/>
+          <p:cNvCxnSpPr>
+            <a:stCxn id="22" idx="3"/>
+          </p:cNvCxnSpPr>
+          <p:nvPr/>
+        </p:nvCxnSpPr>
+        <p:spPr>
+          <a:xfrm>
+            <a:off x="2439930" y="2171890"/>
+            <a:ext cx="514349" cy="540662"/>
+          </a:xfrm>
+          <a:prstGeom prst="curvedConnector2">
+            <a:avLst/>
+          </a:prstGeom>
+          <a:ln>
+            <a:solidFill>
+              <a:srgbClr val="00B050"/>
+            </a:solidFill>
+            <a:tailEnd type="arrow"/>
+          </a:ln>
+        </p:spPr>
+        <p:style>
+          <a:lnRef idx="1">
+            <a:schemeClr val="accent1"/>
+          </a:lnRef>
+          <a:fillRef idx="0">
+            <a:schemeClr val="accent1"/>
+          </a:fillRef>
+          <a:effectRef idx="0">
+            <a:schemeClr val="accent1"/>
+          </a:effectRef>
+          <a:fontRef idx="minor">
+            <a:schemeClr val="tx1"/>
+          </a:fontRef>
+        </p:style>
+      </p:cxnSp>
+      <p:sp>
+        <p:nvSpPr>
+          <p:cNvPr id="25" name="TextBox 24"/>
+          <p:cNvSpPr txBox="1"/>
+          <p:nvPr/>
+        </p:nvSpPr>
+        <p:spPr>
+          <a:xfrm>
+            <a:off x="2630429" y="1641312"/>
+            <a:ext cx="2083071" cy="369332"/>
+          </a:xfrm>
+          <a:prstGeom prst="rect">
+            <a:avLst/>
+          </a:prstGeom>
+          <a:noFill/>
+        </p:spPr>
+        <p:txBody>
+          <a:bodyPr wrap="none" rtlCol="0">
+            <a:spAutoFit/>
+          </a:bodyPr>
+          <a:lstStyle/>
+          <a:p>
+            <a:r>
+              <a:rPr lang="en-US" dirty="0" smtClean="0">
+                <a:solidFill>
+                  <a:srgbClr val="0070C0"/>
+                </a:solidFill>
+              </a:rPr>
+              <a:t>import</a:t>
+            </a:r>
+            <a:r>
+              <a:rPr lang="en-US" dirty="0" smtClean="0"/>
+              <a:t> </a:t>
+            </a:r>
+            <a:r>
+              <a:rPr lang="en-US" dirty="0" err="1" smtClean="0"/>
+              <a:t>numpy</a:t>
+            </a:r>
+            <a:r>
+              <a:rPr lang="en-US" dirty="0" smtClean="0"/>
+              <a:t> </a:t>
+            </a:r>
+            <a:r>
+              <a:rPr lang="en-US" dirty="0" smtClean="0">
+                <a:solidFill>
+                  <a:srgbClr val="0070C0"/>
+                </a:solidFill>
+              </a:rPr>
+              <a:t>as</a:t>
+            </a:r>
+            <a:r>
+              <a:rPr lang="en-US" dirty="0" smtClean="0"/>
+              <a:t> np</a:t>
+            </a:r>
+            <a:endParaRPr lang="en-US" dirty="0"/>
+          </a:p>
+        </p:txBody>
+      </p:sp>
+      <p:sp>
+        <p:nvSpPr>
+          <p:cNvPr id="27" name="TextBox 26"/>
+          <p:cNvSpPr txBox="1"/>
+          <p:nvPr/>
+        </p:nvSpPr>
+        <p:spPr>
+          <a:xfrm>
+            <a:off x="1314319" y="3127239"/>
+            <a:ext cx="815673" cy="276999"/>
+          </a:xfrm>
+          <a:prstGeom prst="rect">
+            <a:avLst/>
+          </a:prstGeom>
+          <a:noFill/>
+        </p:spPr>
+        <p:txBody>
+          <a:bodyPr wrap="none" rtlCol="0">
+            <a:spAutoFit/>
+          </a:bodyPr>
+          <a:lstStyle/>
+          <a:p>
+            <a:r>
+              <a:rPr lang="en-US" sz="1200" dirty="0" smtClean="0">
+                <a:solidFill>
+                  <a:srgbClr val="00B050"/>
+                </a:solidFill>
+              </a:rPr>
+              <a:t>Value is: </a:t>
+            </a:r>
+            <a:r>
+              <a:rPr lang="en-US" sz="1200" dirty="0" smtClean="0">
+                <a:solidFill>
+                  <a:srgbClr val="00B050"/>
+                </a:solidFill>
+              </a:rPr>
+              <a:t>3</a:t>
+            </a:r>
+            <a:endParaRPr lang="en-US" sz="1200" dirty="0">
+              <a:solidFill>
+                <a:srgbClr val="00B050"/>
+              </a:solidFill>
+            </a:endParaRPr>
+          </a:p>
+        </p:txBody>
+      </p:sp>
+      <p:cxnSp>
+        <p:nvCxnSpPr>
+          <p:cNvPr id="28" name="Curved Connector 27"/>
+          <p:cNvCxnSpPr/>
+          <p:nvPr/>
+        </p:nvCxnSpPr>
+        <p:spPr>
+          <a:xfrm>
+            <a:off x="2133602" y="3265741"/>
+            <a:ext cx="574557" cy="361733"/>
+          </a:xfrm>
+          <a:prstGeom prst="curvedConnector3">
+            <a:avLst/>
+          </a:prstGeom>
+          <a:ln>
+            <a:solidFill>
+              <a:srgbClr val="00B050"/>
+            </a:solidFill>
+            <a:tailEnd type="arrow"/>
+          </a:ln>
+        </p:spPr>
+        <p:style>
+          <a:lnRef idx="1">
+            <a:schemeClr val="accent1"/>
+          </a:lnRef>
+          <a:fillRef idx="0">
+            <a:schemeClr val="accent1"/>
+          </a:fillRef>
+          <a:effectRef idx="0">
+            <a:schemeClr val="accent1"/>
+          </a:effectRef>
+          <a:fontRef idx="minor">
+            <a:schemeClr val="tx1"/>
+          </a:fontRef>
+        </p:style>
+      </p:cxnSp>
+      <p:sp>
+        <p:nvSpPr>
+          <p:cNvPr id="29" name="TextBox 28"/>
+          <p:cNvSpPr txBox="1"/>
+          <p:nvPr/>
+        </p:nvSpPr>
+        <p:spPr>
+          <a:xfrm>
+            <a:off x="5343014" y="2955695"/>
+            <a:ext cx="2442785" cy="276999"/>
+          </a:xfrm>
+          <a:prstGeom prst="rect">
+            <a:avLst/>
+          </a:prstGeom>
+          <a:noFill/>
+        </p:spPr>
+        <p:txBody>
+          <a:bodyPr wrap="none" rtlCol="0">
+            <a:spAutoFit/>
+          </a:bodyPr>
+          <a:lstStyle/>
+          <a:p>
+            <a:r>
+              <a:rPr lang="en-US" sz="1200" dirty="0" err="1" smtClean="0">
+                <a:solidFill>
+                  <a:srgbClr val="00B050"/>
+                </a:solidFill>
+              </a:rPr>
+              <a:t>Numpy</a:t>
+            </a:r>
+            <a:r>
+              <a:rPr lang="en-US" sz="1200" dirty="0" smtClean="0">
+                <a:solidFill>
+                  <a:srgbClr val="00B050"/>
+                </a:solidFill>
+              </a:rPr>
+              <a:t> function to </a:t>
+            </a:r>
+            <a:r>
+              <a:rPr lang="en-US" sz="1200" dirty="0" smtClean="0">
+                <a:solidFill>
+                  <a:srgbClr val="00B050"/>
+                </a:solidFill>
+              </a:rPr>
+              <a:t>calculate </a:t>
+            </a:r>
+            <a:r>
+              <a:rPr lang="en-US" sz="1200" dirty="0" err="1" smtClean="0">
+                <a:solidFill>
+                  <a:srgbClr val="00B050"/>
+                </a:solidFill>
+              </a:rPr>
+              <a:t>argmax</a:t>
+            </a:r>
+            <a:endParaRPr lang="en-US" sz="1200" dirty="0">
+              <a:solidFill>
+                <a:srgbClr val="00B050"/>
+              </a:solidFill>
+            </a:endParaRPr>
+          </a:p>
+        </p:txBody>
+      </p:sp>
+      <p:cxnSp>
+        <p:nvCxnSpPr>
+          <p:cNvPr id="30" name="Curved Connector 29"/>
+          <p:cNvCxnSpPr/>
+          <p:nvPr/>
+        </p:nvCxnSpPr>
+        <p:spPr>
+          <a:xfrm rot="10800000" flipV="1">
+            <a:off x="3706145" y="3094196"/>
+            <a:ext cx="1608294" cy="533278"/>
+          </a:xfrm>
+          <a:prstGeom prst="curvedConnector3">
+            <a:avLst>
+              <a:gd name="adj1" fmla="val 102710"/>
+            </a:avLst>
+          </a:prstGeom>
+          <a:ln>
+            <a:solidFill>
+              <a:srgbClr val="00B050"/>
+            </a:solidFill>
+            <a:tailEnd type="arrow"/>
+          </a:ln>
+        </p:spPr>
+        <p:style>
+          <a:lnRef idx="1">
+            <a:schemeClr val="accent1"/>
+          </a:lnRef>
+          <a:fillRef idx="0">
+            <a:schemeClr val="accent1"/>
+          </a:fillRef>
+          <a:effectRef idx="0">
+            <a:schemeClr val="accent1"/>
+          </a:effectRef>
+          <a:fontRef idx="minor">
+            <a:schemeClr val="tx1"/>
+          </a:fontRef>
+        </p:style>
+      </p:cxnSp>
+      <p:sp>
+        <p:nvSpPr>
+          <p:cNvPr id="32" name="TextBox 31"/>
+          <p:cNvSpPr txBox="1"/>
+          <p:nvPr/>
+        </p:nvSpPr>
+        <p:spPr>
+          <a:xfrm>
+            <a:off x="4213225" y="1105725"/>
+            <a:ext cx="3591624" cy="276999"/>
+          </a:xfrm>
+          <a:prstGeom prst="rect">
+            <a:avLst/>
+          </a:prstGeom>
+          <a:noFill/>
+        </p:spPr>
+        <p:txBody>
+          <a:bodyPr wrap="none" rtlCol="0">
+            <a:spAutoFit/>
+          </a:bodyPr>
+          <a:lstStyle/>
+          <a:p>
+            <a:r>
+              <a:rPr lang="en-US" sz="1200" dirty="0" smtClean="0">
+                <a:solidFill>
+                  <a:srgbClr val="00B050"/>
+                </a:solidFill>
+              </a:rPr>
+              <a:t>Keyword to refer to library by an alias (shortcut) name </a:t>
+            </a:r>
+            <a:endParaRPr lang="en-US" sz="1200" dirty="0">
+              <a:solidFill>
+                <a:srgbClr val="00B050"/>
+              </a:solidFill>
+            </a:endParaRPr>
+          </a:p>
+        </p:txBody>
+      </p:sp>
+      <p:cxnSp>
+        <p:nvCxnSpPr>
+          <p:cNvPr id="33" name="Curved Connector 32"/>
+          <p:cNvCxnSpPr/>
+          <p:nvPr/>
+        </p:nvCxnSpPr>
+        <p:spPr>
+          <a:xfrm rot="5400000">
+            <a:off x="4086619" y="1458499"/>
+            <a:ext cx="381745" cy="190498"/>
+          </a:xfrm>
+          <a:prstGeom prst="curvedConnector3">
+            <a:avLst/>
+          </a:prstGeom>
+          <a:ln>
+            <a:solidFill>
+              <a:srgbClr val="00B050"/>
+            </a:solidFill>
+            <a:tailEnd type="arrow"/>
+          </a:ln>
+        </p:spPr>
+        <p:style>
+          <a:lnRef idx="1">
+            <a:schemeClr val="accent1"/>
+          </a:lnRef>
+          <a:fillRef idx="0">
+            <a:schemeClr val="accent1"/>
+          </a:fillRef>
+          <a:effectRef idx="0">
+            <a:schemeClr val="accent1"/>
+          </a:effectRef>
+          <a:fontRef idx="minor">
+            <a:schemeClr val="tx1"/>
+          </a:fontRef>
+        </p:style>
+      </p:cxnSp>
+      <p:cxnSp>
+        <p:nvCxnSpPr>
+          <p:cNvPr id="36" name="Straight Connector 35"/>
+          <p:cNvCxnSpPr/>
+          <p:nvPr/>
+        </p:nvCxnSpPr>
+        <p:spPr>
+          <a:xfrm flipV="1">
+            <a:off x="228600" y="4038600"/>
+            <a:ext cx="8534400" cy="76200"/>
+          </a:xfrm>
+          <a:prstGeom prst="line">
+            <a:avLst/>
+          </a:prstGeom>
+          <a:ln>
+            <a:solidFill>
+              <a:schemeClr val="bg1">
+                <a:lumMod val="65000"/>
+              </a:schemeClr>
+            </a:solidFill>
+            <a:prstDash val="dash"/>
+          </a:ln>
+        </p:spPr>
+        <p:style>
+          <a:lnRef idx="1">
+            <a:schemeClr val="accent1"/>
+          </a:lnRef>
+          <a:fillRef idx="0">
+            <a:schemeClr val="accent1"/>
+          </a:fillRef>
+          <a:effectRef idx="0">
+            <a:schemeClr val="accent1"/>
+          </a:effectRef>
+          <a:fontRef idx="minor">
+            <a:schemeClr val="tx1"/>
+          </a:fontRef>
+        </p:style>
+      </p:cxnSp>
+      <p:sp>
+        <p:nvSpPr>
+          <p:cNvPr id="37" name="TextBox 36"/>
+          <p:cNvSpPr txBox="1"/>
+          <p:nvPr/>
+        </p:nvSpPr>
+        <p:spPr>
+          <a:xfrm>
+            <a:off x="2654468" y="4667250"/>
+            <a:ext cx="4647875" cy="1200329"/>
+          </a:xfrm>
+          <a:prstGeom prst="rect">
+            <a:avLst/>
+          </a:prstGeom>
+          <a:noFill/>
+        </p:spPr>
+        <p:txBody>
+          <a:bodyPr wrap="none" rtlCol="0">
+            <a:spAutoFit/>
+          </a:bodyPr>
+          <a:lstStyle/>
+          <a:p>
+            <a:r>
+              <a:rPr lang="en-US" dirty="0" smtClean="0"/>
+              <a:t>data = </a:t>
+            </a:r>
+            <a:r>
+              <a:rPr lang="en-US" dirty="0" err="1" smtClean="0"/>
+              <a:t>np.array</a:t>
+            </a:r>
+            <a:r>
+              <a:rPr lang="en-US" dirty="0" smtClean="0"/>
+              <a:t>( </a:t>
+            </a:r>
+            <a:r>
+              <a:rPr lang="en-US" dirty="0" smtClean="0"/>
+              <a:t>[ [ </a:t>
+            </a:r>
+            <a:r>
+              <a:rPr lang="en-US" dirty="0" smtClean="0"/>
+              <a:t>1, 2, 3 </a:t>
+            </a:r>
+            <a:r>
+              <a:rPr lang="en-US" dirty="0" smtClean="0"/>
+              <a:t>], [ 4, 5, 6 ], [ 0, 2, 3 ] )</a:t>
+            </a:r>
+          </a:p>
+          <a:p>
+            <a:endParaRPr lang="en-US" dirty="0" smtClean="0"/>
+          </a:p>
+          <a:p>
+            <a:endParaRPr lang="en-US" dirty="0"/>
+          </a:p>
+          <a:p>
+            <a:r>
+              <a:rPr lang="en-US" dirty="0" smtClean="0"/>
+              <a:t>x = </a:t>
+            </a:r>
+            <a:r>
+              <a:rPr lang="en-US" dirty="0" err="1" smtClean="0"/>
+              <a:t>np.argmax</a:t>
+            </a:r>
+            <a:r>
+              <a:rPr lang="en-US" dirty="0" smtClean="0"/>
+              <a:t>( data )</a:t>
+            </a:r>
+            <a:endParaRPr lang="en-US" dirty="0" smtClean="0"/>
+          </a:p>
+        </p:txBody>
+      </p:sp>
+      <p:sp>
+        <p:nvSpPr>
+          <p:cNvPr id="38" name="TextBox 37"/>
+          <p:cNvSpPr txBox="1"/>
+          <p:nvPr/>
+        </p:nvSpPr>
+        <p:spPr>
+          <a:xfrm>
+            <a:off x="5005614" y="4127455"/>
+            <a:ext cx="2836097" cy="276999"/>
+          </a:xfrm>
+          <a:prstGeom prst="rect">
+            <a:avLst/>
+          </a:prstGeom>
+          <a:noFill/>
+        </p:spPr>
+        <p:txBody>
+          <a:bodyPr wrap="none" rtlCol="0">
+            <a:spAutoFit/>
+          </a:bodyPr>
+          <a:lstStyle/>
+          <a:p>
+            <a:r>
+              <a:rPr lang="en-US" sz="1200" dirty="0" err="1" smtClean="0">
+                <a:solidFill>
+                  <a:srgbClr val="00B050"/>
+                </a:solidFill>
+              </a:rPr>
+              <a:t>Numpy</a:t>
+            </a:r>
+            <a:r>
+              <a:rPr lang="en-US" sz="1200" dirty="0" smtClean="0">
+                <a:solidFill>
+                  <a:srgbClr val="00B050"/>
+                </a:solidFill>
+              </a:rPr>
+              <a:t> function to create a </a:t>
+            </a:r>
+            <a:r>
+              <a:rPr lang="en-US" sz="1200" dirty="0" err="1" smtClean="0">
+                <a:solidFill>
+                  <a:srgbClr val="00B050"/>
+                </a:solidFill>
+              </a:rPr>
+              <a:t>numpy</a:t>
+            </a:r>
+            <a:r>
+              <a:rPr lang="en-US" sz="1200" dirty="0" smtClean="0">
+                <a:solidFill>
+                  <a:srgbClr val="00B050"/>
+                </a:solidFill>
+              </a:rPr>
+              <a:t> </a:t>
+            </a:r>
+            <a:r>
+              <a:rPr lang="en-US" sz="1200" dirty="0" smtClean="0">
+                <a:solidFill>
+                  <a:srgbClr val="00B050"/>
+                </a:solidFill>
+              </a:rPr>
+              <a:t>matrix </a:t>
+            </a:r>
+            <a:endParaRPr lang="en-US" sz="1200" dirty="0">
+              <a:solidFill>
+                <a:srgbClr val="00B050"/>
+              </a:solidFill>
+            </a:endParaRPr>
+          </a:p>
+        </p:txBody>
+      </p:sp>
+      <p:cxnSp>
+        <p:nvCxnSpPr>
+          <p:cNvPr id="39" name="Curved Connector 38"/>
+          <p:cNvCxnSpPr/>
+          <p:nvPr/>
+        </p:nvCxnSpPr>
+        <p:spPr>
+          <a:xfrm rot="10800000" flipV="1">
+            <a:off x="3997494" y="4265954"/>
+            <a:ext cx="1008120" cy="533278"/>
+          </a:xfrm>
+          <a:prstGeom prst="curvedConnector3">
+            <a:avLst>
+              <a:gd name="adj1" fmla="val 100076"/>
+            </a:avLst>
+          </a:prstGeom>
+          <a:ln>
+            <a:solidFill>
+              <a:srgbClr val="00B050"/>
+            </a:solidFill>
+            <a:tailEnd type="arrow"/>
+          </a:ln>
+        </p:spPr>
+        <p:style>
+          <a:lnRef idx="1">
+            <a:schemeClr val="accent1"/>
+          </a:lnRef>
+          <a:fillRef idx="0">
+            <a:schemeClr val="accent1"/>
+          </a:fillRef>
+          <a:effectRef idx="0">
+            <a:schemeClr val="accent1"/>
+          </a:effectRef>
+          <a:fontRef idx="minor">
+            <a:schemeClr val="tx1"/>
+          </a:fontRef>
+        </p:style>
+      </p:cxnSp>
+      <p:sp>
+        <p:nvSpPr>
+          <p:cNvPr id="40" name="TextBox 39"/>
+          <p:cNvSpPr txBox="1"/>
+          <p:nvPr/>
+        </p:nvSpPr>
+        <p:spPr>
+          <a:xfrm>
+            <a:off x="1282344" y="5128914"/>
+            <a:ext cx="815673" cy="276999"/>
+          </a:xfrm>
+          <a:prstGeom prst="rect">
+            <a:avLst/>
+          </a:prstGeom>
+          <a:noFill/>
+        </p:spPr>
+        <p:txBody>
+          <a:bodyPr wrap="none" rtlCol="0">
+            <a:spAutoFit/>
+          </a:bodyPr>
+          <a:lstStyle/>
+          <a:p>
+            <a:r>
+              <a:rPr lang="en-US" sz="1200" dirty="0" smtClean="0">
+                <a:solidFill>
+                  <a:srgbClr val="00B050"/>
+                </a:solidFill>
+              </a:rPr>
+              <a:t>Value is: </a:t>
+            </a:r>
+            <a:r>
+              <a:rPr lang="en-US" sz="1200" dirty="0" smtClean="0">
+                <a:solidFill>
+                  <a:srgbClr val="00B050"/>
+                </a:solidFill>
+              </a:rPr>
+              <a:t>6</a:t>
+            </a:r>
+            <a:endParaRPr lang="en-US" sz="1200" dirty="0">
+              <a:solidFill>
+                <a:srgbClr val="00B050"/>
+              </a:solidFill>
+            </a:endParaRPr>
+          </a:p>
+        </p:txBody>
+      </p:sp>
+      <p:cxnSp>
+        <p:nvCxnSpPr>
+          <p:cNvPr id="41" name="Curved Connector 40"/>
+          <p:cNvCxnSpPr/>
+          <p:nvPr/>
+        </p:nvCxnSpPr>
+        <p:spPr>
+          <a:xfrm>
+            <a:off x="2101627" y="5267416"/>
+            <a:ext cx="574557" cy="361733"/>
+          </a:xfrm>
+          <a:prstGeom prst="curvedConnector3">
+            <a:avLst/>
+          </a:prstGeom>
+          <a:ln>
+            <a:solidFill>
+              <a:srgbClr val="00B050"/>
+            </a:solidFill>
+            <a:tailEnd type="arrow"/>
+          </a:ln>
+        </p:spPr>
+        <p:style>
+          <a:lnRef idx="1">
+            <a:schemeClr val="accent1"/>
+          </a:lnRef>
+          <a:fillRef idx="0">
+            <a:schemeClr val="accent1"/>
+          </a:fillRef>
+          <a:effectRef idx="0">
+            <a:schemeClr val="accent1"/>
+          </a:effectRef>
+          <a:fontRef idx="minor">
+            <a:schemeClr val="tx1"/>
+          </a:fontRef>
+        </p:style>
+      </p:cxnSp>
+      <p:sp>
+        <p:nvSpPr>
+          <p:cNvPr id="42" name="TextBox 41"/>
+          <p:cNvSpPr txBox="1"/>
+          <p:nvPr/>
+        </p:nvSpPr>
+        <p:spPr>
+          <a:xfrm>
+            <a:off x="334039" y="6096000"/>
+            <a:ext cx="8077404" cy="523220"/>
+          </a:xfrm>
+          <a:prstGeom prst="rect">
+            <a:avLst/>
+          </a:prstGeom>
+          <a:noFill/>
+        </p:spPr>
+        <p:txBody>
+          <a:bodyPr wrap="none" rtlCol="0">
+            <a:spAutoFit/>
+          </a:bodyPr>
+          <a:lstStyle/>
+          <a:p>
+            <a:r>
+              <a:rPr lang="en-US" sz="1400" i="1" dirty="0" smtClean="0"/>
+              <a:t>Note: </a:t>
+            </a:r>
+            <a:r>
+              <a:rPr lang="en-US" sz="1400" i="1" dirty="0" err="1" smtClean="0"/>
+              <a:t>numpy.argmax</a:t>
+            </a:r>
+            <a:r>
+              <a:rPr lang="en-US" sz="1400" i="1" dirty="0" smtClean="0"/>
+              <a:t> does not evaluate a function for the maximum output, but takes a set (which may have</a:t>
+            </a:r>
+          </a:p>
+          <a:p>
+            <a:r>
+              <a:rPr lang="en-US" sz="1400" i="1" dirty="0" err="1" smtClean="0"/>
+              <a:t>bBeen</a:t>
+            </a:r>
+            <a:r>
+              <a:rPr lang="en-US" sz="1400" i="1" dirty="0" smtClean="0"/>
+              <a:t> generated by a function), and finds the maximum value in the set.</a:t>
+            </a:r>
+            <a:endParaRPr lang="en-US" sz="1400" i="1" dirty="0"/>
+          </a:p>
+        </p:txBody>
+      </p:sp>
+    </p:spTree>
+    <p:extLst>
+      <p:ext uri="{BB962C8B-B14F-4D97-AF65-F5344CB8AC3E}">
+        <p14:creationId xmlns:p14="http://schemas.microsoft.com/office/powerpoint/2010/main" val="1209359621"/>
       </p:ext>
     </p:extLst>
   </p:cSld>

</xml_diff>

<commit_message>
fix typos in argmax
</commit_message>
<xml_diff>
--- a/Presentations/Stats - ArgMax.pptx
+++ b/Presentations/Stats - ArgMax.pptx
@@ -196,7 +196,7 @@
           <a:p>
             <a:fld id="{FAF957FC-5175-49AC-8D2B-2F056FFFC1DD}" type="datetimeFigureOut">
               <a:rPr lang="en-US" smtClean="0"/>
-              <a:t>7/27/2017</a:t>
+              <a:t>7/30/2017</a:t>
             </a:fld>
             <a:endParaRPr lang="en-US"/>
           </a:p>
@@ -646,7 +646,7 @@
             <a:fld id="{1D8BD707-D9CF-40AE-B4C6-C98DA3205C09}" type="datetimeFigureOut">
               <a:rPr lang="en-US" smtClean="0"/>
               <a:pPr/>
-              <a:t>7/27/2017</a:t>
+              <a:t>7/30/2017</a:t>
             </a:fld>
             <a:endParaRPr lang="en-US"/>
           </a:p>
@@ -813,7 +813,7 @@
             <a:fld id="{1D8BD707-D9CF-40AE-B4C6-C98DA3205C09}" type="datetimeFigureOut">
               <a:rPr lang="en-US" smtClean="0"/>
               <a:pPr/>
-              <a:t>7/27/2017</a:t>
+              <a:t>7/30/2017</a:t>
             </a:fld>
             <a:endParaRPr lang="en-US"/>
           </a:p>
@@ -990,7 +990,7 @@
             <a:fld id="{1D8BD707-D9CF-40AE-B4C6-C98DA3205C09}" type="datetimeFigureOut">
               <a:rPr lang="en-US" smtClean="0"/>
               <a:pPr/>
-              <a:t>7/27/2017</a:t>
+              <a:t>7/30/2017</a:t>
             </a:fld>
             <a:endParaRPr lang="en-US"/>
           </a:p>
@@ -1157,7 +1157,7 @@
             <a:fld id="{1D8BD707-D9CF-40AE-B4C6-C98DA3205C09}" type="datetimeFigureOut">
               <a:rPr lang="en-US" smtClean="0"/>
               <a:pPr/>
-              <a:t>7/27/2017</a:t>
+              <a:t>7/30/2017</a:t>
             </a:fld>
             <a:endParaRPr lang="en-US"/>
           </a:p>
@@ -1400,7 +1400,7 @@
             <a:fld id="{1D8BD707-D9CF-40AE-B4C6-C98DA3205C09}" type="datetimeFigureOut">
               <a:rPr lang="en-US" smtClean="0"/>
               <a:pPr/>
-              <a:t>7/27/2017</a:t>
+              <a:t>7/30/2017</a:t>
             </a:fld>
             <a:endParaRPr lang="en-US"/>
           </a:p>
@@ -1685,7 +1685,7 @@
             <a:fld id="{1D8BD707-D9CF-40AE-B4C6-C98DA3205C09}" type="datetimeFigureOut">
               <a:rPr lang="en-US" smtClean="0"/>
               <a:pPr/>
-              <a:t>7/27/2017</a:t>
+              <a:t>7/30/2017</a:t>
             </a:fld>
             <a:endParaRPr lang="en-US"/>
           </a:p>
@@ -2104,7 +2104,7 @@
             <a:fld id="{1D8BD707-D9CF-40AE-B4C6-C98DA3205C09}" type="datetimeFigureOut">
               <a:rPr lang="en-US" smtClean="0"/>
               <a:pPr/>
-              <a:t>7/27/2017</a:t>
+              <a:t>7/30/2017</a:t>
             </a:fld>
             <a:endParaRPr lang="en-US"/>
           </a:p>
@@ -2219,7 +2219,7 @@
             <a:fld id="{1D8BD707-D9CF-40AE-B4C6-C98DA3205C09}" type="datetimeFigureOut">
               <a:rPr lang="en-US" smtClean="0"/>
               <a:pPr/>
-              <a:t>7/27/2017</a:t>
+              <a:t>7/30/2017</a:t>
             </a:fld>
             <a:endParaRPr lang="en-US"/>
           </a:p>
@@ -2311,7 +2311,7 @@
             <a:fld id="{1D8BD707-D9CF-40AE-B4C6-C98DA3205C09}" type="datetimeFigureOut">
               <a:rPr lang="en-US" smtClean="0"/>
               <a:pPr/>
-              <a:t>7/27/2017</a:t>
+              <a:t>7/30/2017</a:t>
             </a:fld>
             <a:endParaRPr lang="en-US"/>
           </a:p>
@@ -2585,7 +2585,7 @@
             <a:fld id="{1D8BD707-D9CF-40AE-B4C6-C98DA3205C09}" type="datetimeFigureOut">
               <a:rPr lang="en-US" smtClean="0"/>
               <a:pPr/>
-              <a:t>7/27/2017</a:t>
+              <a:t>7/30/2017</a:t>
             </a:fld>
             <a:endParaRPr lang="en-US"/>
           </a:p>
@@ -2835,7 +2835,7 @@
             <a:fld id="{1D8BD707-D9CF-40AE-B4C6-C98DA3205C09}" type="datetimeFigureOut">
               <a:rPr lang="en-US" smtClean="0"/>
               <a:pPr/>
-              <a:t>7/27/2017</a:t>
+              <a:t>7/30/2017</a:t>
             </a:fld>
             <a:endParaRPr lang="en-US"/>
           </a:p>
@@ -3045,7 +3045,7 @@
             <a:fld id="{1D8BD707-D9CF-40AE-B4C6-C98DA3205C09}" type="datetimeFigureOut">
               <a:rPr lang="en-US" smtClean="0"/>
               <a:pPr/>
-              <a:t>7/27/2017</a:t>
+              <a:t>7/30/2017</a:t>
             </a:fld>
             <a:endParaRPr lang="en-US"/>
           </a:p>
@@ -4043,27 +4043,47 @@
                   </a:schemeClr>
                 </a:solidFill>
               </a:rPr>
-              <a:t>Condition is met where element x</a:t>
-            </a:r>
-            <a:r>
-              <a:rPr lang="en-US" sz="2400" b="1" baseline="-25000" dirty="0" smtClean="0">
+              <a:t>Condition is met where element </a:t>
+            </a:r>
+            <a:r>
+              <a:rPr lang="en-US" sz="2400" b="1" dirty="0" err="1" smtClean="0">
                 <a:solidFill>
                   <a:schemeClr val="accent5">
                     <a:lumMod val="75000"/>
                   </a:schemeClr>
                 </a:solidFill>
               </a:rPr>
-              <a:t>i</a:t>
-            </a:r>
-            <a:r>
-              <a:rPr lang="en-US" sz="2400" b="1" dirty="0" smtClean="0">
+              <a:t>x</a:t>
+            </a:r>
+            <a:r>
+              <a:rPr lang="en-US" sz="2400" b="1" baseline="-25000" dirty="0" err="1" smtClean="0">
                 <a:solidFill>
                   <a:schemeClr val="accent5">
                     <a:lumMod val="75000"/>
                   </a:schemeClr>
                 </a:solidFill>
               </a:rPr>
-              <a:t> is the maximum in x ∈ S, when:</a:t>
+              <a:t>j</a:t>
+            </a:r>
+            <a:r>
+              <a:rPr lang="en-US" sz="2400" b="1" dirty="0" smtClean="0">
+                <a:solidFill>
+                  <a:schemeClr val="accent5">
+                    <a:lumMod val="75000"/>
+                  </a:schemeClr>
+                </a:solidFill>
+              </a:rPr>
+              <a:t> </a:t>
+            </a:r>
+            <a:r>
+              <a:rPr lang="en-US" sz="2400" b="1" dirty="0" smtClean="0">
+                <a:solidFill>
+                  <a:schemeClr val="accent5">
+                    <a:lumMod val="75000"/>
+                  </a:schemeClr>
+                </a:solidFill>
+              </a:rPr>
+              <a:t>is the maximum in x ∈ S, when:</a:t>
             </a:r>
           </a:p>
           <a:p>
@@ -4719,27 +4739,47 @@
                   </a:schemeClr>
                 </a:solidFill>
               </a:rPr>
-              <a:t>    one element x</a:t>
-            </a:r>
-            <a:r>
-              <a:rPr lang="en-US" sz="2400" b="1" baseline="-25000" dirty="0" smtClean="0">
+              <a:t>    one element </a:t>
+            </a:r>
+            <a:r>
+              <a:rPr lang="en-US" sz="2400" b="1" dirty="0" err="1" smtClean="0">
                 <a:solidFill>
                   <a:schemeClr val="accent5">
                     <a:lumMod val="75000"/>
                   </a:schemeClr>
                 </a:solidFill>
               </a:rPr>
-              <a:t>i</a:t>
-            </a:r>
-            <a:r>
-              <a:rPr lang="en-US" sz="2400" b="1" dirty="0" smtClean="0">
+              <a:t>x</a:t>
+            </a:r>
+            <a:r>
+              <a:rPr lang="en-US" sz="2400" b="1" baseline="-25000" dirty="0" err="1" smtClean="0">
                 <a:solidFill>
                   <a:schemeClr val="accent5">
                     <a:lumMod val="75000"/>
                   </a:schemeClr>
                 </a:solidFill>
               </a:rPr>
-              <a:t> that is greater than or equal to the output of</a:t>
+              <a:t>j</a:t>
+            </a:r>
+            <a:r>
+              <a:rPr lang="en-US" sz="2400" b="1" dirty="0" smtClean="0">
+                <a:solidFill>
+                  <a:schemeClr val="accent5">
+                    <a:lumMod val="75000"/>
+                  </a:schemeClr>
+                </a:solidFill>
+              </a:rPr>
+              <a:t> </a:t>
+            </a:r>
+            <a:r>
+              <a:rPr lang="en-US" sz="2400" b="1" dirty="0" smtClean="0">
+                <a:solidFill>
+                  <a:schemeClr val="accent5">
+                    <a:lumMod val="75000"/>
+                  </a:schemeClr>
+                </a:solidFill>
+              </a:rPr>
+              <a:t>that is greater than or equal to the output of</a:t>
             </a:r>
           </a:p>
           <a:p>
@@ -5568,11 +5608,15 @@
             </a:r>
             <a:r>
               <a:rPr lang="en-US" b="1" dirty="0" smtClean="0"/>
-              <a:t>, -0</a:t>
+              <a:t>, </a:t>
+            </a:r>
+            <a:r>
+              <a:rPr lang="en-US" b="1" dirty="0" smtClean="0"/>
+              <a:t>0 </a:t>
             </a:r>
             <a:r>
               <a:rPr lang="en-US" b="1" dirty="0"/>
-              <a:t> , </a:t>
+              <a:t>, </a:t>
             </a:r>
             <a:r>
               <a:rPr lang="en-US" b="1" dirty="0" smtClean="0"/>
@@ -5587,8 +5631,8 @@
               <a:t>, </a:t>
             </a:r>
             <a:r>
-              <a:rPr lang="en-US" b="1" dirty="0"/>
-              <a:t>-4</a:t>
+              <a:rPr lang="en-US" b="1" dirty="0" smtClean="0"/>
+              <a:t>4</a:t>
             </a:r>
             <a:r>
               <a:rPr lang="en-US" sz="1000" b="1" dirty="0" smtClean="0"/>
@@ -5917,11 +5961,7 @@
             </a:r>
             <a:r>
               <a:rPr lang="en-US" dirty="0" smtClean="0"/>
-              <a:t>( [ 1, 2, 3 ] </a:t>
-            </a:r>
-            <a:r>
-              <a:rPr lang="en-US" dirty="0" smtClean="0"/>
-              <a:t>)</a:t>
+              <a:t>( [ 1, 2, 3 ] )</a:t>
             </a:r>
           </a:p>
           <a:p>
@@ -5943,7 +5983,6 @@
               <a:rPr lang="en-US" dirty="0" smtClean="0"/>
               <a:t>( data )</a:t>
             </a:r>
-            <a:endParaRPr lang="en-US" dirty="0" smtClean="0"/>
           </a:p>
         </p:txBody>
       </p:sp>
@@ -6209,15 +6248,7 @@
                   <a:srgbClr val="00B050"/>
                 </a:solidFill>
               </a:rPr>
-              <a:t>Value is: </a:t>
-            </a:r>
-            <a:r>
-              <a:rPr lang="en-US" sz="1200" dirty="0" smtClean="0">
-                <a:solidFill>
-                  <a:srgbClr val="00B050"/>
-                </a:solidFill>
-              </a:rPr>
-              <a:t>3</a:t>
+              <a:t>Value is: 3</a:t>
             </a:r>
             <a:endParaRPr lang="en-US" sz="1200" dirty="0">
               <a:solidFill>
@@ -6299,15 +6330,7 @@
                   <a:srgbClr val="00B050"/>
                 </a:solidFill>
               </a:rPr>
-              <a:t> function to </a:t>
-            </a:r>
-            <a:r>
-              <a:rPr lang="en-US" sz="1200" dirty="0" smtClean="0">
-                <a:solidFill>
-                  <a:srgbClr val="00B050"/>
-                </a:solidFill>
-              </a:rPr>
-              <a:t>calculate </a:t>
+              <a:t> function to calculate </a:t>
             </a:r>
             <a:r>
               <a:rPr lang="en-US" sz="1200" dirty="0" err="1" smtClean="0">
@@ -6507,19 +6530,7 @@
             </a:r>
             <a:r>
               <a:rPr lang="en-US" dirty="0" smtClean="0"/>
-              <a:t>( </a:t>
-            </a:r>
-            <a:r>
-              <a:rPr lang="en-US" dirty="0" smtClean="0"/>
-              <a:t>[ [ </a:t>
-            </a:r>
-            <a:r>
-              <a:rPr lang="en-US" dirty="0" smtClean="0"/>
-              <a:t>1, 2, 3 </a:t>
-            </a:r>
-            <a:r>
-              <a:rPr lang="en-US" dirty="0" smtClean="0"/>
-              <a:t>], [ 4, 5, 6 ], [ 0, 2, 3 ] )</a:t>
+              <a:t>( [ [ 1, 2, 3 ], [ 4, 5, 6 ], [ 0, 2, 3 ] )</a:t>
             </a:r>
           </a:p>
           <a:p>
@@ -6541,7 +6552,6 @@
               <a:rPr lang="en-US" dirty="0" smtClean="0"/>
               <a:t>( data )</a:t>
             </a:r>
-            <a:endParaRPr lang="en-US" dirty="0" smtClean="0"/>
           </a:p>
         </p:txBody>
       </p:sp>
@@ -6597,15 +6607,7 @@
                   <a:srgbClr val="00B050"/>
                 </a:solidFill>
               </a:rPr>
-              <a:t> </a:t>
-            </a:r>
-            <a:r>
-              <a:rPr lang="en-US" sz="1200" dirty="0" smtClean="0">
-                <a:solidFill>
-                  <a:srgbClr val="00B050"/>
-                </a:solidFill>
-              </a:rPr>
-              <a:t>matrix </a:t>
+              <a:t> matrix </a:t>
             </a:r>
             <a:endParaRPr lang="en-US" sz="1200" dirty="0">
               <a:solidFill>
@@ -6681,15 +6683,7 @@
                   <a:srgbClr val="00B050"/>
                 </a:solidFill>
               </a:rPr>
-              <a:t>Value is: </a:t>
-            </a:r>
-            <a:r>
-              <a:rPr lang="en-US" sz="1200" dirty="0" smtClean="0">
-                <a:solidFill>
-                  <a:srgbClr val="00B050"/>
-                </a:solidFill>
-              </a:rPr>
-              <a:t>6</a:t>
+              <a:t>Value is: 6</a:t>
             </a:r>
             <a:endParaRPr lang="en-US" sz="1200" dirty="0">
               <a:solidFill>

</xml_diff>